<commit_message>
new project of student mangement
</commit_message>
<xml_diff>
--- a/Database.pptx
+++ b/Database.pptx
@@ -277,7 +277,7 @@
           <a:p>
             <a:fld id="{E3FC7F50-1F17-4B68-B1BF-174DD059E268}" type="datetimeFigureOut">
               <a:rPr lang="en-US" smtClean="0"/>
-              <a:t>20-Jan-26</a:t>
+              <a:t>25-Jan-26</a:t>
             </a:fld>
             <a:endParaRPr lang="en-US"/>
           </a:p>
@@ -475,7 +475,7 @@
           <a:p>
             <a:fld id="{E3FC7F50-1F17-4B68-B1BF-174DD059E268}" type="datetimeFigureOut">
               <a:rPr lang="en-US" smtClean="0"/>
-              <a:t>20-Jan-26</a:t>
+              <a:t>25-Jan-26</a:t>
             </a:fld>
             <a:endParaRPr lang="en-US"/>
           </a:p>
@@ -683,7 +683,7 @@
           <a:p>
             <a:fld id="{E3FC7F50-1F17-4B68-B1BF-174DD059E268}" type="datetimeFigureOut">
               <a:rPr lang="en-US" smtClean="0"/>
-              <a:t>20-Jan-26</a:t>
+              <a:t>25-Jan-26</a:t>
             </a:fld>
             <a:endParaRPr lang="en-US"/>
           </a:p>
@@ -881,7 +881,7 @@
           <a:p>
             <a:fld id="{E3FC7F50-1F17-4B68-B1BF-174DD059E268}" type="datetimeFigureOut">
               <a:rPr lang="en-US" smtClean="0"/>
-              <a:t>20-Jan-26</a:t>
+              <a:t>25-Jan-26</a:t>
             </a:fld>
             <a:endParaRPr lang="en-US"/>
           </a:p>
@@ -1156,7 +1156,7 @@
           <a:p>
             <a:fld id="{E3FC7F50-1F17-4B68-B1BF-174DD059E268}" type="datetimeFigureOut">
               <a:rPr lang="en-US" smtClean="0"/>
-              <a:t>20-Jan-26</a:t>
+              <a:t>25-Jan-26</a:t>
             </a:fld>
             <a:endParaRPr lang="en-US"/>
           </a:p>
@@ -1421,7 +1421,7 @@
           <a:p>
             <a:fld id="{E3FC7F50-1F17-4B68-B1BF-174DD059E268}" type="datetimeFigureOut">
               <a:rPr lang="en-US" smtClean="0"/>
-              <a:t>20-Jan-26</a:t>
+              <a:t>25-Jan-26</a:t>
             </a:fld>
             <a:endParaRPr lang="en-US"/>
           </a:p>
@@ -1833,7 +1833,7 @@
           <a:p>
             <a:fld id="{E3FC7F50-1F17-4B68-B1BF-174DD059E268}" type="datetimeFigureOut">
               <a:rPr lang="en-US" smtClean="0"/>
-              <a:t>20-Jan-26</a:t>
+              <a:t>25-Jan-26</a:t>
             </a:fld>
             <a:endParaRPr lang="en-US"/>
           </a:p>
@@ -1974,7 +1974,7 @@
           <a:p>
             <a:fld id="{E3FC7F50-1F17-4B68-B1BF-174DD059E268}" type="datetimeFigureOut">
               <a:rPr lang="en-US" smtClean="0"/>
-              <a:t>20-Jan-26</a:t>
+              <a:t>25-Jan-26</a:t>
             </a:fld>
             <a:endParaRPr lang="en-US"/>
           </a:p>
@@ -2087,7 +2087,7 @@
           <a:p>
             <a:fld id="{E3FC7F50-1F17-4B68-B1BF-174DD059E268}" type="datetimeFigureOut">
               <a:rPr lang="en-US" smtClean="0"/>
-              <a:t>20-Jan-26</a:t>
+              <a:t>25-Jan-26</a:t>
             </a:fld>
             <a:endParaRPr lang="en-US"/>
           </a:p>
@@ -2398,7 +2398,7 @@
           <a:p>
             <a:fld id="{E3FC7F50-1F17-4B68-B1BF-174DD059E268}" type="datetimeFigureOut">
               <a:rPr lang="en-US" smtClean="0"/>
-              <a:t>20-Jan-26</a:t>
+              <a:t>25-Jan-26</a:t>
             </a:fld>
             <a:endParaRPr lang="en-US"/>
           </a:p>
@@ -2686,7 +2686,7 @@
           <a:p>
             <a:fld id="{E3FC7F50-1F17-4B68-B1BF-174DD059E268}" type="datetimeFigureOut">
               <a:rPr lang="en-US" smtClean="0"/>
-              <a:t>20-Jan-26</a:t>
+              <a:t>25-Jan-26</a:t>
             </a:fld>
             <a:endParaRPr lang="en-US"/>
           </a:p>
@@ -2927,7 +2927,7 @@
           <a:p>
             <a:fld id="{E3FC7F50-1F17-4B68-B1BF-174DD059E268}" type="datetimeFigureOut">
               <a:rPr lang="en-US" smtClean="0"/>
-              <a:t>20-Jan-26</a:t>
+              <a:t>25-Jan-26</a:t>
             </a:fld>
             <a:endParaRPr lang="en-US"/>
           </a:p>
@@ -5866,13 +5866,7 @@
   <p:cSld>
     <p:spTree>
       <p:nvGrpSpPr>
-        <p:cNvPr id="1" name="">
-          <a:extLst>
-            <a:ext uri="{FF2B5EF4-FFF2-40B4-BE49-F238E27FC236}">
-              <a16:creationId xmlns:a16="http://schemas.microsoft.com/office/drawing/2014/main" id="{ADAFD0BE-408F-6214-32C8-F8C0053E9719}"/>
-            </a:ext>
-          </a:extLst>
-        </p:cNvPr>
+        <p:cNvPr id="1" name=""/>
         <p:cNvGrpSpPr/>
         <p:nvPr/>
       </p:nvGrpSpPr>
@@ -5889,7 +5883,7 @@
           <p:cNvPr id="2" name="Title 1">
             <a:extLst>
               <a:ext uri="{FF2B5EF4-FFF2-40B4-BE49-F238E27FC236}">
-                <a16:creationId xmlns:a16="http://schemas.microsoft.com/office/drawing/2014/main" id="{62A3DD70-EC79-A5D9-FD71-333362E126FE}"/>
+                <a16:creationId xmlns:a16="http://schemas.microsoft.com/office/drawing/2014/main" id="{28CC5EF9-B6D8-3108-6A1C-2EB614FB0C44}"/>
               </a:ext>
             </a:extLst>
           </p:cNvPr>
@@ -5907,7 +5901,11 @@
           <a:p>
             <a:r>
               <a:rPr lang="en-US" dirty="0"/>
-              <a:t>CRUD Operation ( continue )</a:t>
+              <a:t>SQL – Structured </a:t>
+            </a:r>
+            <a:r>
+              <a:rPr lang="en-US"/>
+              <a:t>Query Language</a:t>
             </a:r>
           </a:p>
         </p:txBody>
@@ -5917,7 +5915,7 @@
           <p:cNvPr id="3" name="Content Placeholder 2">
             <a:extLst>
               <a:ext uri="{FF2B5EF4-FFF2-40B4-BE49-F238E27FC236}">
-                <a16:creationId xmlns:a16="http://schemas.microsoft.com/office/drawing/2014/main" id="{E193854F-F806-12F3-63B4-4564B95D5866}"/>
+                <a16:creationId xmlns:a16="http://schemas.microsoft.com/office/drawing/2014/main" id="{371DECC8-DEA3-B2E7-7169-CA0B564C0CC7}"/>
               </a:ext>
             </a:extLst>
           </p:cNvPr>
@@ -5933,109 +5931,14 @@
           <a:bodyPr/>
           <a:lstStyle/>
           <a:p>
-            <a:pPr marL="0" indent="0">
-              <a:buNone/>
-            </a:pPr>
-            <a:r>
-              <a:rPr lang="en-US" dirty="0"/>
-              <a:t>Create database </a:t>
-            </a:r>
-            <a:r>
-              <a:rPr lang="en-US" dirty="0" err="1"/>
-              <a:t>sms</a:t>
-            </a:r>
-            <a:r>
-              <a:rPr lang="en-US" dirty="0"/>
-              <a:t>;</a:t>
-            </a:r>
-          </a:p>
-          <a:p>
-            <a:pPr marL="0" indent="0">
-              <a:buNone/>
-            </a:pPr>
-            <a:r>
-              <a:rPr lang="en-US" dirty="0"/>
-              <a:t>This will create a database file named </a:t>
-            </a:r>
-            <a:r>
-              <a:rPr lang="en-US" dirty="0" err="1"/>
-              <a:t>sms</a:t>
-            </a:r>
-            <a:endParaRPr lang="en-US" dirty="0"/>
-          </a:p>
-          <a:p>
-            <a:pPr marL="0" indent="0">
-              <a:buNone/>
-            </a:pPr>
-            <a:r>
-              <a:rPr lang="en-US" dirty="0"/>
-              <a:t>To show all database use :</a:t>
-            </a:r>
-          </a:p>
-          <a:p>
-            <a:pPr marL="0" indent="0">
-              <a:buNone/>
-            </a:pPr>
-            <a:r>
-              <a:rPr lang="en-US" dirty="0"/>
-              <a:t>show databases;</a:t>
-            </a:r>
-          </a:p>
-          <a:p>
-            <a:pPr marL="0" indent="0">
-              <a:buNone/>
-            </a:pPr>
-            <a:r>
-              <a:rPr lang="en-US" dirty="0"/>
-              <a:t>To use database:</a:t>
-            </a:r>
-          </a:p>
-          <a:p>
-            <a:pPr marL="0" indent="0">
-              <a:buNone/>
-            </a:pPr>
-            <a:r>
-              <a:rPr lang="en-US" dirty="0"/>
-              <a:t>use </a:t>
-            </a:r>
-            <a:r>
-              <a:rPr lang="en-US" dirty="0" err="1"/>
-              <a:t>sms</a:t>
-            </a:r>
-            <a:r>
-              <a:rPr lang="en-US" dirty="0"/>
-              <a:t>;</a:t>
-            </a:r>
-          </a:p>
-          <a:p>
-            <a:pPr marL="0" indent="0">
-              <a:buNone/>
-            </a:pPr>
-            <a:r>
-              <a:rPr lang="en-US" dirty="0"/>
-              <a:t>To create table:</a:t>
-            </a:r>
-          </a:p>
-          <a:p>
-            <a:pPr marL="0" indent="0">
-              <a:buNone/>
-            </a:pPr>
-            <a:r>
-              <a:rPr lang="en-US" dirty="0"/>
-              <a:t>Create </a:t>
-            </a:r>
-            <a:r>
-              <a:rPr lang="en-US"/>
-              <a:t>table student(</a:t>
-            </a:r>
-            <a:endParaRPr lang="en-US" dirty="0"/>
+            <a:endParaRPr lang="en-US"/>
           </a:p>
         </p:txBody>
       </p:sp>
     </p:spTree>
     <p:extLst>
       <p:ext uri="{BB962C8B-B14F-4D97-AF65-F5344CB8AC3E}">
-        <p14:creationId xmlns:p14="http://schemas.microsoft.com/office/powerpoint/2010/main" val="4082724291"/>
+        <p14:creationId xmlns:p14="http://schemas.microsoft.com/office/powerpoint/2010/main" val="1466456294"/>
       </p:ext>
     </p:extLst>
   </p:cSld>

</xml_diff>